<commit_message>
Update Presentation~ At the end of that life - Crossroads.pptx
</commit_message>
<xml_diff>
--- a/2. ART405 - Honours Project Proposal and Development/Presentation~ At the end of that life - Crossroads.pptx
+++ b/2. ART405 - Honours Project Proposal and Development/Presentation~ At the end of that life - Crossroads.pptx
@@ -5,14 +5,13 @@
     <p:sldMasterId id="2147483648" r:id="rId1"/>
   </p:sldMasterIdLst>
   <p:notesMasterIdLst>
-    <p:notesMasterId r:id="rId7"/>
+    <p:notesMasterId r:id="rId6"/>
   </p:notesMasterIdLst>
   <p:sldIdLst>
     <p:sldId id="256" r:id="rId2"/>
     <p:sldId id="257" r:id="rId3"/>
     <p:sldId id="258" r:id="rId4"/>
-    <p:sldId id="259" r:id="rId5"/>
-    <p:sldId id="260" r:id="rId6"/>
+    <p:sldId id="261" r:id="rId5"/>
   </p:sldIdLst>
   <p:sldSz cx="12192000" cy="6858000"/>
   <p:notesSz cx="6858000" cy="9144000"/>
@@ -201,7 +200,7 @@
           <a:p>
             <a:fld id="{91EC2A8B-B824-4C8C-9D49-45DA5A232DEE}" type="datetimeFigureOut">
               <a:rPr lang="en-IN" smtClean="0"/>
-              <a:t>30-10-2022</a:t>
+              <a:t>01-11-2022</a:t>
             </a:fld>
             <a:endParaRPr lang="en-IN"/>
           </a:p>
@@ -609,7 +608,7 @@
           <a:p>
             <a:r>
               <a:rPr lang="en-IN" dirty="0"/>
-              <a:t>The game will have a top down, isometric view which is like to Disco Elysium. Since we are trying to tell a story, the game mechanics will be based on the story and it will be mostly linear. This has been inspired from “What remains of Edith Finch” which tells us the story of the deaths in a family. The gameplay is very narrative driven and is unlike any having effortless, easy and yet unique puzzles. </a:t>
+              <a:t>The game will have a top down, isometric view which is like to Disco Elysium. Since we are trying to tell a story, the game mechanics will be based on the story and it will be mostly linear. The gameplay is inspired from “What remains of Edith Finch”  and is very narrative driven having effortless, easy and yet unique puzzles. </a:t>
             </a:r>
           </a:p>
           <a:p>
@@ -618,7 +617,7 @@
           <a:p>
             <a:r>
               <a:rPr lang="en-IN" dirty="0"/>
-              <a:t>I’ve always liked prototyping games. Since this is my hons year project, I wanted to work on something more challenging and this project is a bit more ambitious that the other games I’ve worked on. It will be helpful to have it on my portfolio as I want to start my own Studio. This will showcase my design and development skills as well as being the team lead will show my project management.</a:t>
+              <a:t>I’ve always liked prototyping games. Since this is my hons year project, I wanted to work on something more challenging and this project is a more ambitious that the other games I’ve worked on. It will be helpful to have it on my portfolio as I want to start my own Studio. This will showcase my design and development skills as well as being the team lead will show my project management.</a:t>
             </a:r>
           </a:p>
         </p:txBody>
@@ -888,7 +887,7 @@
                   </a:schemeClr>
                 </a:solidFill>
               </a:rPr>
-              <a:t>Identifying main events in the narrative of my game and deciding how to go about gamer progression.</a:t>
+              <a:t>Identifying main events in the narrative of my game and deciding how to go about game progression.</a:t>
             </a:r>
           </a:p>
           <a:p>
@@ -1041,19 +1040,8 @@
                 <a:effectLst/>
                 <a:latin typeface="Lato" panose="020F0502020204030203" pitchFamily="34" charset="0"/>
               </a:rPr>
-              <a:t>What have you identified as the key related work for your project? This could be texts you have read/will read, industry or market reports, professional publications or talks, other artists or practitioners, or existing games, art, or media linked to your research topic. Consider the research context section of your proposal when preparing this slide.</a:t>
-            </a:r>
-          </a:p>
-          <a:p>
-            <a:endParaRPr lang="en-US" b="1" i="0" dirty="0">
-              <a:solidFill>
-                <a:srgbClr val="565A5C"/>
-              </a:solidFill>
-              <a:effectLst/>
-              <a:latin typeface="Lato" panose="020F0502020204030203" pitchFamily="34" charset="0"/>
-            </a:endParaRPr>
-          </a:p>
-          <a:p>
+              <a:t>This is our WIP</a:t>
+            </a:r>
             <a:endParaRPr lang="en-IN" b="1" dirty="0"/>
           </a:p>
         </p:txBody>
@@ -1084,112 +1072,7 @@
     </p:spTree>
     <p:extLst>
       <p:ext uri="{BB962C8B-B14F-4D97-AF65-F5344CB8AC3E}">
-        <p14:creationId xmlns:p14="http://schemas.microsoft.com/office/powerpoint/2010/main" val="3056548642"/>
-      </p:ext>
-    </p:extLst>
-  </p:cSld>
-  <p:clrMapOvr>
-    <a:masterClrMapping/>
-  </p:clrMapOvr>
-</p:notes>
-</file>
-
-<file path=ppt/notesSlides/notesSlide5.xml><?xml version="1.0" encoding="utf-8"?>
-<p:notes xmlns:a="http://schemas.openxmlformats.org/drawingml/2006/main" xmlns:r="http://schemas.openxmlformats.org/officeDocument/2006/relationships" xmlns:p="http://schemas.openxmlformats.org/presentationml/2006/main">
-  <p:cSld>
-    <p:spTree>
-      <p:nvGrpSpPr>
-        <p:cNvPr id="1" name=""/>
-        <p:cNvGrpSpPr/>
-        <p:nvPr/>
-      </p:nvGrpSpPr>
-      <p:grpSpPr>
-        <a:xfrm>
-          <a:off x="0" y="0"/>
-          <a:ext cx="0" cy="0"/>
-          <a:chOff x="0" y="0"/>
-          <a:chExt cx="0" cy="0"/>
-        </a:xfrm>
-      </p:grpSpPr>
-      <p:sp>
-        <p:nvSpPr>
-          <p:cNvPr id="2" name="Slide Image Placeholder 1"/>
-          <p:cNvSpPr>
-            <a:spLocks noGrp="1" noRot="1" noChangeAspect="1"/>
-          </p:cNvSpPr>
-          <p:nvPr>
-            <p:ph type="sldImg"/>
-          </p:nvPr>
-        </p:nvSpPr>
-        <p:spPr/>
-      </p:sp>
-      <p:sp>
-        <p:nvSpPr>
-          <p:cNvPr id="3" name="Notes Placeholder 2"/>
-          <p:cNvSpPr>
-            <a:spLocks noGrp="1"/>
-          </p:cNvSpPr>
-          <p:nvPr>
-            <p:ph type="body" idx="1"/>
-          </p:nvPr>
-        </p:nvSpPr>
-        <p:spPr/>
-        <p:txBody>
-          <a:bodyPr/>
-          <a:lstStyle/>
-          <a:p>
-            <a:r>
-              <a:rPr lang="en-US" b="1" i="0" dirty="0">
-                <a:solidFill>
-                  <a:srgbClr val="565A5C"/>
-                </a:solidFill>
-                <a:effectLst/>
-                <a:latin typeface="Lato" panose="020F0502020204030203" pitchFamily="34" charset="0"/>
-              </a:rPr>
-              <a:t>You may want to make this 2 slides rather than one dependent upon what you want to show, or consider embedding video. Use this slide to show us what you have developed so far for your project. This should be practical work, such as the kind of work listed as being appropriate for your concept development and pre-production portfolio submission.</a:t>
-            </a:r>
-          </a:p>
-          <a:p>
-            <a:endParaRPr lang="en-US" b="1" i="0" dirty="0">
-              <a:solidFill>
-                <a:srgbClr val="565A5C"/>
-              </a:solidFill>
-              <a:effectLst/>
-              <a:latin typeface="Lato" panose="020F0502020204030203" pitchFamily="34" charset="0"/>
-            </a:endParaRPr>
-          </a:p>
-          <a:p>
-            <a:endParaRPr lang="en-IN" b="1" dirty="0"/>
-          </a:p>
-        </p:txBody>
-      </p:sp>
-      <p:sp>
-        <p:nvSpPr>
-          <p:cNvPr id="4" name="Slide Number Placeholder 3"/>
-          <p:cNvSpPr>
-            <a:spLocks noGrp="1"/>
-          </p:cNvSpPr>
-          <p:nvPr>
-            <p:ph type="sldNum" sz="quarter" idx="5"/>
-          </p:nvPr>
-        </p:nvSpPr>
-        <p:spPr/>
-        <p:txBody>
-          <a:bodyPr/>
-          <a:lstStyle/>
-          <a:p>
-            <a:fld id="{7CFFBB67-A05D-4BF7-A944-B32B8F114F55}" type="slidenum">
-              <a:rPr lang="en-IN" smtClean="0"/>
-              <a:t>5</a:t>
-            </a:fld>
-            <a:endParaRPr lang="en-IN"/>
-          </a:p>
-        </p:txBody>
-      </p:sp>
-    </p:spTree>
-    <p:extLst>
-      <p:ext uri="{BB962C8B-B14F-4D97-AF65-F5344CB8AC3E}">
-        <p14:creationId xmlns:p14="http://schemas.microsoft.com/office/powerpoint/2010/main" val="312089533"/>
+        <p14:creationId xmlns:p14="http://schemas.microsoft.com/office/powerpoint/2010/main" val="3861037649"/>
       </p:ext>
     </p:extLst>
   </p:cSld>
@@ -1348,7 +1231,7 @@
           <a:p>
             <a:fld id="{6DCFC1F5-745C-451C-A43A-1076D5FDF378}" type="datetimeFigureOut">
               <a:rPr lang="en-IN" smtClean="0"/>
-              <a:t>30-10-2022</a:t>
+              <a:t>01-11-2022</a:t>
             </a:fld>
             <a:endParaRPr lang="en-IN"/>
           </a:p>
@@ -1548,7 +1431,7 @@
           <a:p>
             <a:fld id="{6DCFC1F5-745C-451C-A43A-1076D5FDF378}" type="datetimeFigureOut">
               <a:rPr lang="en-IN" smtClean="0"/>
-              <a:t>30-10-2022</a:t>
+              <a:t>01-11-2022</a:t>
             </a:fld>
             <a:endParaRPr lang="en-IN"/>
           </a:p>
@@ -1758,7 +1641,7 @@
           <a:p>
             <a:fld id="{6DCFC1F5-745C-451C-A43A-1076D5FDF378}" type="datetimeFigureOut">
               <a:rPr lang="en-IN" smtClean="0"/>
-              <a:t>30-10-2022</a:t>
+              <a:t>01-11-2022</a:t>
             </a:fld>
             <a:endParaRPr lang="en-IN"/>
           </a:p>
@@ -1958,7 +1841,7 @@
           <a:p>
             <a:fld id="{6DCFC1F5-745C-451C-A43A-1076D5FDF378}" type="datetimeFigureOut">
               <a:rPr lang="en-IN" smtClean="0"/>
-              <a:t>30-10-2022</a:t>
+              <a:t>01-11-2022</a:t>
             </a:fld>
             <a:endParaRPr lang="en-IN"/>
           </a:p>
@@ -2234,7 +2117,7 @@
           <a:p>
             <a:fld id="{6DCFC1F5-745C-451C-A43A-1076D5FDF378}" type="datetimeFigureOut">
               <a:rPr lang="en-IN" smtClean="0"/>
-              <a:t>30-10-2022</a:t>
+              <a:t>01-11-2022</a:t>
             </a:fld>
             <a:endParaRPr lang="en-IN"/>
           </a:p>
@@ -2502,7 +2385,7 @@
           <a:p>
             <a:fld id="{6DCFC1F5-745C-451C-A43A-1076D5FDF378}" type="datetimeFigureOut">
               <a:rPr lang="en-IN" smtClean="0"/>
-              <a:t>30-10-2022</a:t>
+              <a:t>01-11-2022</a:t>
             </a:fld>
             <a:endParaRPr lang="en-IN"/>
           </a:p>
@@ -2917,7 +2800,7 @@
           <a:p>
             <a:fld id="{6DCFC1F5-745C-451C-A43A-1076D5FDF378}" type="datetimeFigureOut">
               <a:rPr lang="en-IN" smtClean="0"/>
-              <a:t>30-10-2022</a:t>
+              <a:t>01-11-2022</a:t>
             </a:fld>
             <a:endParaRPr lang="en-IN"/>
           </a:p>
@@ -3059,7 +2942,7 @@
           <a:p>
             <a:fld id="{6DCFC1F5-745C-451C-A43A-1076D5FDF378}" type="datetimeFigureOut">
               <a:rPr lang="en-IN" smtClean="0"/>
-              <a:t>30-10-2022</a:t>
+              <a:t>01-11-2022</a:t>
             </a:fld>
             <a:endParaRPr lang="en-IN"/>
           </a:p>
@@ -3172,7 +3055,7 @@
           <a:p>
             <a:fld id="{6DCFC1F5-745C-451C-A43A-1076D5FDF378}" type="datetimeFigureOut">
               <a:rPr lang="en-IN" smtClean="0"/>
-              <a:t>30-10-2022</a:t>
+              <a:t>01-11-2022</a:t>
             </a:fld>
             <a:endParaRPr lang="en-IN"/>
           </a:p>
@@ -3485,7 +3368,7 @@
           <a:p>
             <a:fld id="{6DCFC1F5-745C-451C-A43A-1076D5FDF378}" type="datetimeFigureOut">
               <a:rPr lang="en-IN" smtClean="0"/>
-              <a:t>30-10-2022</a:t>
+              <a:t>01-11-2022</a:t>
             </a:fld>
             <a:endParaRPr lang="en-IN"/>
           </a:p>
@@ -3774,7 +3657,7 @@
           <a:p>
             <a:fld id="{6DCFC1F5-745C-451C-A43A-1076D5FDF378}" type="datetimeFigureOut">
               <a:rPr lang="en-IN" smtClean="0"/>
-              <a:t>30-10-2022</a:t>
+              <a:t>01-11-2022</a:t>
             </a:fld>
             <a:endParaRPr lang="en-IN"/>
           </a:p>
@@ -4017,7 +3900,7 @@
           <a:p>
             <a:fld id="{6DCFC1F5-745C-451C-A43A-1076D5FDF378}" type="datetimeFigureOut">
               <a:rPr lang="en-IN" smtClean="0"/>
-              <a:t>30-10-2022</a:t>
+              <a:t>01-11-2022</a:t>
             </a:fld>
             <a:endParaRPr lang="en-IN"/>
           </a:p>
@@ -4445,6 +4328,38 @@
           <a:chExt cx="0" cy="0"/>
         </a:xfrm>
       </p:grpSpPr>
+      <p:pic>
+        <p:nvPicPr>
+          <p:cNvPr id="6" name="Picture 5">
+            <a:extLst>
+              <a:ext uri="{FF2B5EF4-FFF2-40B4-BE49-F238E27FC236}">
+                <a16:creationId xmlns:a16="http://schemas.microsoft.com/office/drawing/2014/main" id="{BDD61C2C-06BB-2D51-42C4-AE932727697F}"/>
+              </a:ext>
+            </a:extLst>
+          </p:cNvPr>
+          <p:cNvPicPr>
+            <a:picLocks noChangeAspect="1"/>
+          </p:cNvPicPr>
+          <p:nvPr/>
+        </p:nvPicPr>
+        <p:blipFill>
+          <a:blip r:embed="rId3">
+            <a:alphaModFix/>
+          </a:blip>
+          <a:stretch>
+            <a:fillRect/>
+          </a:stretch>
+        </p:blipFill>
+        <p:spPr>
+          <a:xfrm>
+            <a:off x="0" y="0"/>
+            <a:ext cx="12192000" cy="6858000"/>
+          </a:xfrm>
+          <a:prstGeom prst="rect">
+            <a:avLst/>
+          </a:prstGeom>
+        </p:spPr>
+      </p:pic>
       <p:sp>
         <p:nvSpPr>
           <p:cNvPr id="2" name="Title 1">
@@ -4554,6 +4469,171 @@
   <p:clrMapOvr>
     <a:masterClrMapping/>
   </p:clrMapOvr>
+  <p:timing>
+    <p:tnLst>
+      <p:par>
+        <p:cTn id="1" dur="indefinite" restart="never" nodeType="tmRoot">
+          <p:childTnLst>
+            <p:seq concurrent="1" nextAc="seek">
+              <p:cTn id="2" dur="indefinite" nodeType="mainSeq">
+                <p:childTnLst>
+                  <p:par>
+                    <p:cTn id="3" fill="hold">
+                      <p:stCondLst>
+                        <p:cond delay="indefinite"/>
+                      </p:stCondLst>
+                      <p:childTnLst>
+                        <p:par>
+                          <p:cTn id="4" fill="hold">
+                            <p:stCondLst>
+                              <p:cond delay="0"/>
+                            </p:stCondLst>
+                            <p:childTnLst>
+                              <p:par>
+                                <p:cTn id="5" presetID="10" presetClass="exit" presetSubtype="0" fill="hold" grpId="0" nodeType="clickEffect">
+                                  <p:stCondLst>
+                                    <p:cond delay="0"/>
+                                  </p:stCondLst>
+                                  <p:childTnLst>
+                                    <p:animEffect transition="out" filter="fade">
+                                      <p:cBhvr>
+                                        <p:cTn id="6" dur="500"/>
+                                        <p:tgtEl>
+                                          <p:spTgt spid="2"/>
+                                        </p:tgtEl>
+                                      </p:cBhvr>
+                                    </p:animEffect>
+                                    <p:set>
+                                      <p:cBhvr>
+                                        <p:cTn id="7" dur="1" fill="hold">
+                                          <p:stCondLst>
+                                            <p:cond delay="499"/>
+                                          </p:stCondLst>
+                                        </p:cTn>
+                                        <p:tgtEl>
+                                          <p:spTgt spid="2"/>
+                                        </p:tgtEl>
+                                        <p:attrNameLst>
+                                          <p:attrName>style.visibility</p:attrName>
+                                        </p:attrNameLst>
+                                      </p:cBhvr>
+                                      <p:to>
+                                        <p:strVal val="hidden"/>
+                                      </p:to>
+                                    </p:set>
+                                  </p:childTnLst>
+                                </p:cTn>
+                              </p:par>
+                              <p:par>
+                                <p:cTn id="8" presetID="10" presetClass="exit" presetSubtype="0" fill="hold" grpId="0" nodeType="withEffect">
+                                  <p:stCondLst>
+                                    <p:cond delay="0"/>
+                                  </p:stCondLst>
+                                  <p:childTnLst>
+                                    <p:animEffect transition="out" filter="fade">
+                                      <p:cBhvr>
+                                        <p:cTn id="9" dur="500"/>
+                                        <p:tgtEl>
+                                          <p:spTgt spid="3">
+                                            <p:txEl>
+                                              <p:pRg st="0" end="0"/>
+                                            </p:txEl>
+                                          </p:spTgt>
+                                        </p:tgtEl>
+                                      </p:cBhvr>
+                                    </p:animEffect>
+                                    <p:set>
+                                      <p:cBhvr>
+                                        <p:cTn id="10" dur="1" fill="hold">
+                                          <p:stCondLst>
+                                            <p:cond delay="499"/>
+                                          </p:stCondLst>
+                                        </p:cTn>
+                                        <p:tgtEl>
+                                          <p:spTgt spid="3">
+                                            <p:txEl>
+                                              <p:pRg st="0" end="0"/>
+                                            </p:txEl>
+                                          </p:spTgt>
+                                        </p:tgtEl>
+                                        <p:attrNameLst>
+                                          <p:attrName>style.visibility</p:attrName>
+                                        </p:attrNameLst>
+                                      </p:cBhvr>
+                                      <p:to>
+                                        <p:strVal val="hidden"/>
+                                      </p:to>
+                                    </p:set>
+                                  </p:childTnLst>
+                                </p:cTn>
+                              </p:par>
+                              <p:par>
+                                <p:cTn id="11" presetID="10" presetClass="entr" presetSubtype="0" fill="hold" nodeType="withEffect">
+                                  <p:stCondLst>
+                                    <p:cond delay="0"/>
+                                  </p:stCondLst>
+                                  <p:childTnLst>
+                                    <p:set>
+                                      <p:cBhvr>
+                                        <p:cTn id="12" dur="1" fill="hold">
+                                          <p:stCondLst>
+                                            <p:cond delay="0"/>
+                                          </p:stCondLst>
+                                        </p:cTn>
+                                        <p:tgtEl>
+                                          <p:spTgt spid="6"/>
+                                        </p:tgtEl>
+                                        <p:attrNameLst>
+                                          <p:attrName>style.visibility</p:attrName>
+                                        </p:attrNameLst>
+                                      </p:cBhvr>
+                                      <p:to>
+                                        <p:strVal val="visible"/>
+                                      </p:to>
+                                    </p:set>
+                                    <p:animEffect transition="in" filter="fade">
+                                      <p:cBhvr>
+                                        <p:cTn id="13" dur="500"/>
+                                        <p:tgtEl>
+                                          <p:spTgt spid="6"/>
+                                        </p:tgtEl>
+                                      </p:cBhvr>
+                                    </p:animEffect>
+                                  </p:childTnLst>
+                                </p:cTn>
+                              </p:par>
+                            </p:childTnLst>
+                          </p:cTn>
+                        </p:par>
+                      </p:childTnLst>
+                    </p:cTn>
+                  </p:par>
+                </p:childTnLst>
+              </p:cTn>
+              <p:prevCondLst>
+                <p:cond evt="onPrev" delay="0">
+                  <p:tgtEl>
+                    <p:sldTgt/>
+                  </p:tgtEl>
+                </p:cond>
+              </p:prevCondLst>
+              <p:nextCondLst>
+                <p:cond evt="onNext" delay="0">
+                  <p:tgtEl>
+                    <p:sldTgt/>
+                  </p:tgtEl>
+                </p:cond>
+              </p:nextCondLst>
+            </p:seq>
+          </p:childTnLst>
+        </p:cTn>
+      </p:par>
+    </p:tnLst>
+    <p:bldLst>
+      <p:bldP spid="2" grpId="0"/>
+      <p:bldP spid="3" grpId="0" build="p"/>
+    </p:bldLst>
+  </p:timing>
 </p:sld>
 </file>
 
@@ -5726,48 +5806,7 @@
     </p:spTree>
     <p:extLst>
       <p:ext uri="{BB962C8B-B14F-4D97-AF65-F5344CB8AC3E}">
-        <p14:creationId xmlns:p14="http://schemas.microsoft.com/office/powerpoint/2010/main" val="2671928724"/>
-      </p:ext>
-    </p:extLst>
-  </p:cSld>
-  <p:clrMapOvr>
-    <a:masterClrMapping/>
-  </p:clrMapOvr>
-</p:sld>
-</file>
-
-<file path=ppt/slides/slide5.xml><?xml version="1.0" encoding="utf-8"?>
-<p:sld xmlns:a="http://schemas.openxmlformats.org/drawingml/2006/main" xmlns:r="http://schemas.openxmlformats.org/officeDocument/2006/relationships" xmlns:p="http://schemas.openxmlformats.org/presentationml/2006/main">
-  <p:cSld>
-    <p:bg>
-      <p:bgPr>
-        <a:solidFill>
-          <a:schemeClr val="tx1">
-            <a:lumMod val="85000"/>
-            <a:lumOff val="15000"/>
-          </a:schemeClr>
-        </a:solidFill>
-        <a:effectLst/>
-      </p:bgPr>
-    </p:bg>
-    <p:spTree>
-      <p:nvGrpSpPr>
-        <p:cNvPr id="1" name=""/>
-        <p:cNvGrpSpPr/>
-        <p:nvPr/>
-      </p:nvGrpSpPr>
-      <p:grpSpPr>
-        <a:xfrm>
-          <a:off x="0" y="0"/>
-          <a:ext cx="0" cy="0"/>
-          <a:chOff x="0" y="0"/>
-          <a:chExt cx="0" cy="0"/>
-        </a:xfrm>
-      </p:grpSpPr>
-    </p:spTree>
-    <p:extLst>
-      <p:ext uri="{BB962C8B-B14F-4D97-AF65-F5344CB8AC3E}">
-        <p14:creationId xmlns:p14="http://schemas.microsoft.com/office/powerpoint/2010/main" val="2025846601"/>
+        <p14:creationId xmlns:p14="http://schemas.microsoft.com/office/powerpoint/2010/main" val="873927816"/>
       </p:ext>
     </p:extLst>
   </p:cSld>

</xml_diff>